<commit_message>
update presentations with repository link
</commit_message>
<xml_diff>
--- a/20191214_CentDS_Talk_AI_Global_Bootcamp_Leeds.pptx
+++ b/20191214_CentDS_Talk_AI_Global_Bootcamp_Leeds.pptx
@@ -14328,7 +14328,7 @@
           <a:graphicData uri="http://schemas.openxmlformats.org/presentationml/2006/ole">
             <mc:AlternateContent xmlns:mc="http://schemas.openxmlformats.org/markup-compatibility/2006">
               <mc:Choice xmlns:v="urn:schemas-microsoft-com:vml" Requires="v">
-                <p:oleObj spid="_x0000_s1047" name="CorelDRAW" r:id="rId4" imgW="10437565" imgH="1396161" progId="CorelDraw.Graphic.21">
+                <p:oleObj spid="_x0000_s1048" name="CorelDRAW" r:id="rId4" imgW="10437565" imgH="1396161" progId="CorelDraw.Graphic.21">
                   <p:embed/>
                 </p:oleObj>
               </mc:Choice>
@@ -14825,7 +14825,7 @@
           <a:graphicData uri="http://schemas.openxmlformats.org/presentationml/2006/ole">
             <mc:AlternateContent xmlns:mc="http://schemas.openxmlformats.org/markup-compatibility/2006">
               <mc:Choice xmlns:v="urn:schemas-microsoft-com:vml" Requires="v">
-                <p:oleObj spid="_x0000_s2092" name="CorelDRAW" r:id="rId3" imgW="1486020" imgH="1396161" progId="CorelDraw.Graphic.21">
+                <p:oleObj spid="_x0000_s2094" name="CorelDRAW" r:id="rId3" imgW="1486020" imgH="1396161" progId="CorelDraw.Graphic.21">
                   <p:embed/>
                 </p:oleObj>
               </mc:Choice>
@@ -14890,7 +14890,7 @@
           <a:graphicData uri="http://schemas.openxmlformats.org/presentationml/2006/ole">
             <mc:AlternateContent xmlns:mc="http://schemas.openxmlformats.org/markup-compatibility/2006">
               <mc:Choice xmlns:v="urn:schemas-microsoft-com:vml" Requires="v">
-                <p:oleObj spid="_x0000_s2093" name="CorelDRAW" r:id="rId5" imgW="9928182" imgH="1396161" progId="CorelDraw.Graphic.21">
+                <p:oleObj spid="_x0000_s2095" name="CorelDRAW" r:id="rId5" imgW="9928182" imgH="1396161" progId="CorelDraw.Graphic.21">
                   <p:embed/>
                 </p:oleObj>
               </mc:Choice>
@@ -28555,6 +28555,33 @@
             <a:pPr marL="0" indent="0" algn="just">
               <a:buNone/>
             </a:pPr>
+            <a:r>
+              <a:rPr lang="en-GB" sz="1800" dirty="0">
+                <a:latin typeface="Calibri" panose="020F0502020204030204" pitchFamily="34" charset="0"/>
+                <a:cs typeface="Calibri" panose="020F0502020204030204" pitchFamily="34" charset="0"/>
+              </a:rPr>
+              <a:t>The material from this talk and the ML workshop can be found in the GitHub repository:</a:t>
+            </a:r>
+          </a:p>
+          <a:p>
+            <a:pPr marL="0" indent="0" algn="ctr">
+              <a:buNone/>
+            </a:pPr>
+            <a:r>
+              <a:rPr lang="en-GB" sz="1800" b="1" dirty="0">
+                <a:hlinkClick r:id="rId11"/>
+              </a:rPr>
+              <a:t>https://github.com/AndreaDesan/Global-AI-Bootcamp-Leeds</a:t>
+            </a:r>
+            <a:endParaRPr lang="en-GB" sz="1800" b="1" dirty="0">
+              <a:latin typeface="Calibri" panose="020F0502020204030204" pitchFamily="34" charset="0"/>
+              <a:cs typeface="Calibri" panose="020F0502020204030204" pitchFamily="34" charset="0"/>
+            </a:endParaRPr>
+          </a:p>
+          <a:p>
+            <a:pPr marL="0" indent="0" algn="just">
+              <a:buNone/>
+            </a:pPr>
             <a:endParaRPr lang="it-IT" sz="1800" dirty="0"/>
           </a:p>
         </p:txBody>
@@ -28574,7 +28601,7 @@
           <p:nvPr/>
         </p:nvPicPr>
         <p:blipFill>
-          <a:blip r:embed="rId11">
+          <a:blip r:embed="rId12">
             <a:extLst>
               <a:ext uri="{28A0092B-C50C-407E-A947-70E740481C1C}">
                 <a14:useLocalDpi xmlns:a14="http://schemas.microsoft.com/office/drawing/2010/main" val="0"/>

</xml_diff>